<commit_message>
Cleanup now that MAP eFMI website is published (http://efmi-standard.org).
</commit_message>
<xml_diff>
--- a/assets/images/emphysis-illustration.pptx
+++ b/assets/images/emphysis-illustration.pptx
@@ -1,6 +1,6 @@
 
 <file path=ppt/presentation.xml><?xml version="1.0" encoding="utf-8"?>
-<p:presentation xmlns:a="http://schemas.openxmlformats.org/drawingml/2006/main" xmlns:r="http://schemas.openxmlformats.org/officeDocument/2006/relationships" xmlns:p="http://schemas.openxmlformats.org/presentationml/2006/main" saveSubsetFonts="1">
+<p:presentation xmlns:a="http://schemas.openxmlformats.org/drawingml/2006/main" xmlns:r="http://schemas.openxmlformats.org/officeDocument/2006/relationships" xmlns:p="http://schemas.openxmlformats.org/presentationml/2006/main" embedTrueTypeFonts="1">
   <p:sldMasterIdLst>
     <p:sldMasterId id="2147483648" r:id="rId1"/>
   </p:sldMasterIdLst>
@@ -9,6 +9,20 @@
   </p:sldIdLst>
   <p:sldSz cx="12192000" cy="6858000"/>
   <p:notesSz cx="6858000" cy="9144000"/>
+  <p:embeddedFontLst>
+    <p:embeddedFont>
+      <p:font typeface="Calibri" panose="020F0502020204030204" pitchFamily="34" charset="0"/>
+      <p:regular r:id="rId3"/>
+      <p:bold r:id="rId4"/>
+      <p:italic r:id="rId5"/>
+      <p:boldItalic r:id="rId6"/>
+    </p:embeddedFont>
+    <p:embeddedFont>
+      <p:font typeface="Calibri Light" panose="020F0302020204030204" pitchFamily="34" charset="0"/>
+      <p:regular r:id="rId7"/>
+      <p:italic r:id="rId8"/>
+    </p:embeddedFont>
+  </p:embeddedFontLst>
   <p:defaultTextStyle>
     <a:defPPr>
       <a:defRPr lang="de-DE"/>
@@ -104,6 +118,11 @@
       </a:defRPr>
     </a:lvl9pPr>
   </p:defaultTextStyle>
+  <p:extLst>
+    <p:ext uri="{EFAFB233-063F-42B5-8137-9DF3F51BA10A}">
+      <p15:sldGuideLst xmlns:p15="http://schemas.microsoft.com/office/powerpoint/2012/main"/>
+    </p:ext>
+  </p:extLst>
 </p:presentation>
 </file>
 
@@ -254,7 +273,7 @@
           <a:p>
             <a:fld id="{6F3F68CC-1FAA-4176-AFE4-270A47A5A2D8}" type="datetimeFigureOut">
               <a:rPr lang="de-DE" smtClean="0"/>
-              <a:t>09.02.2021</a:t>
+              <a:t>25.04.2023</a:t>
             </a:fld>
             <a:endParaRPr lang="de-DE"/>
           </a:p>
@@ -308,7 +327,7 @@
           <a:p>
             <a:fld id="{FCBDAD03-24C7-49E5-AC15-B8AB04B577B6}" type="slidenum">
               <a:rPr lang="de-DE" smtClean="0"/>
-              <a:t>‹Nr.›</a:t>
+              <a:t>‹#›</a:t>
             </a:fld>
             <a:endParaRPr lang="de-DE"/>
           </a:p>
@@ -452,7 +471,7 @@
           <a:p>
             <a:fld id="{6F3F68CC-1FAA-4176-AFE4-270A47A5A2D8}" type="datetimeFigureOut">
               <a:rPr lang="de-DE" smtClean="0"/>
-              <a:t>09.02.2021</a:t>
+              <a:t>25.04.2023</a:t>
             </a:fld>
             <a:endParaRPr lang="de-DE"/>
           </a:p>
@@ -506,7 +525,7 @@
           <a:p>
             <a:fld id="{FCBDAD03-24C7-49E5-AC15-B8AB04B577B6}" type="slidenum">
               <a:rPr lang="de-DE" smtClean="0"/>
-              <a:t>‹Nr.›</a:t>
+              <a:t>‹#›</a:t>
             </a:fld>
             <a:endParaRPr lang="de-DE"/>
           </a:p>
@@ -660,7 +679,7 @@
           <a:p>
             <a:fld id="{6F3F68CC-1FAA-4176-AFE4-270A47A5A2D8}" type="datetimeFigureOut">
               <a:rPr lang="de-DE" smtClean="0"/>
-              <a:t>09.02.2021</a:t>
+              <a:t>25.04.2023</a:t>
             </a:fld>
             <a:endParaRPr lang="de-DE"/>
           </a:p>
@@ -714,7 +733,7 @@
           <a:p>
             <a:fld id="{FCBDAD03-24C7-49E5-AC15-B8AB04B577B6}" type="slidenum">
               <a:rPr lang="de-DE" smtClean="0"/>
-              <a:t>‹Nr.›</a:t>
+              <a:t>‹#›</a:t>
             </a:fld>
             <a:endParaRPr lang="de-DE"/>
           </a:p>
@@ -858,7 +877,7 @@
           <a:p>
             <a:fld id="{6F3F68CC-1FAA-4176-AFE4-270A47A5A2D8}" type="datetimeFigureOut">
               <a:rPr lang="de-DE" smtClean="0"/>
-              <a:t>09.02.2021</a:t>
+              <a:t>25.04.2023</a:t>
             </a:fld>
             <a:endParaRPr lang="de-DE"/>
           </a:p>
@@ -912,7 +931,7 @@
           <a:p>
             <a:fld id="{FCBDAD03-24C7-49E5-AC15-B8AB04B577B6}" type="slidenum">
               <a:rPr lang="de-DE" smtClean="0"/>
-              <a:t>‹Nr.›</a:t>
+              <a:t>‹#›</a:t>
             </a:fld>
             <a:endParaRPr lang="de-DE"/>
           </a:p>
@@ -1133,7 +1152,7 @@
           <a:p>
             <a:fld id="{6F3F68CC-1FAA-4176-AFE4-270A47A5A2D8}" type="datetimeFigureOut">
               <a:rPr lang="de-DE" smtClean="0"/>
-              <a:t>09.02.2021</a:t>
+              <a:t>25.04.2023</a:t>
             </a:fld>
             <a:endParaRPr lang="de-DE"/>
           </a:p>
@@ -1187,7 +1206,7 @@
           <a:p>
             <a:fld id="{FCBDAD03-24C7-49E5-AC15-B8AB04B577B6}" type="slidenum">
               <a:rPr lang="de-DE" smtClean="0"/>
-              <a:t>‹Nr.›</a:t>
+              <a:t>‹#›</a:t>
             </a:fld>
             <a:endParaRPr lang="de-DE"/>
           </a:p>
@@ -1398,7 +1417,7 @@
           <a:p>
             <a:fld id="{6F3F68CC-1FAA-4176-AFE4-270A47A5A2D8}" type="datetimeFigureOut">
               <a:rPr lang="de-DE" smtClean="0"/>
-              <a:t>09.02.2021</a:t>
+              <a:t>25.04.2023</a:t>
             </a:fld>
             <a:endParaRPr lang="de-DE"/>
           </a:p>
@@ -1452,7 +1471,7 @@
           <a:p>
             <a:fld id="{FCBDAD03-24C7-49E5-AC15-B8AB04B577B6}" type="slidenum">
               <a:rPr lang="de-DE" smtClean="0"/>
-              <a:t>‹Nr.›</a:t>
+              <a:t>‹#›</a:t>
             </a:fld>
             <a:endParaRPr lang="de-DE"/>
           </a:p>
@@ -1810,7 +1829,7 @@
           <a:p>
             <a:fld id="{6F3F68CC-1FAA-4176-AFE4-270A47A5A2D8}" type="datetimeFigureOut">
               <a:rPr lang="de-DE" smtClean="0"/>
-              <a:t>09.02.2021</a:t>
+              <a:t>25.04.2023</a:t>
             </a:fld>
             <a:endParaRPr lang="de-DE"/>
           </a:p>
@@ -1864,7 +1883,7 @@
           <a:p>
             <a:fld id="{FCBDAD03-24C7-49E5-AC15-B8AB04B577B6}" type="slidenum">
               <a:rPr lang="de-DE" smtClean="0"/>
-              <a:t>‹Nr.›</a:t>
+              <a:t>‹#›</a:t>
             </a:fld>
             <a:endParaRPr lang="de-DE"/>
           </a:p>
@@ -1951,7 +1970,7 @@
           <a:p>
             <a:fld id="{6F3F68CC-1FAA-4176-AFE4-270A47A5A2D8}" type="datetimeFigureOut">
               <a:rPr lang="de-DE" smtClean="0"/>
-              <a:t>09.02.2021</a:t>
+              <a:t>25.04.2023</a:t>
             </a:fld>
             <a:endParaRPr lang="de-DE"/>
           </a:p>
@@ -2005,7 +2024,7 @@
           <a:p>
             <a:fld id="{FCBDAD03-24C7-49E5-AC15-B8AB04B577B6}" type="slidenum">
               <a:rPr lang="de-DE" smtClean="0"/>
-              <a:t>‹Nr.›</a:t>
+              <a:t>‹#›</a:t>
             </a:fld>
             <a:endParaRPr lang="de-DE"/>
           </a:p>
@@ -2064,7 +2083,7 @@
           <a:p>
             <a:fld id="{6F3F68CC-1FAA-4176-AFE4-270A47A5A2D8}" type="datetimeFigureOut">
               <a:rPr lang="de-DE" smtClean="0"/>
-              <a:t>09.02.2021</a:t>
+              <a:t>25.04.2023</a:t>
             </a:fld>
             <a:endParaRPr lang="de-DE"/>
           </a:p>
@@ -2118,7 +2137,7 @@
           <a:p>
             <a:fld id="{FCBDAD03-24C7-49E5-AC15-B8AB04B577B6}" type="slidenum">
               <a:rPr lang="de-DE" smtClean="0"/>
-              <a:t>‹Nr.›</a:t>
+              <a:t>‹#›</a:t>
             </a:fld>
             <a:endParaRPr lang="de-DE"/>
           </a:p>
@@ -2375,7 +2394,7 @@
           <a:p>
             <a:fld id="{6F3F68CC-1FAA-4176-AFE4-270A47A5A2D8}" type="datetimeFigureOut">
               <a:rPr lang="de-DE" smtClean="0"/>
-              <a:t>09.02.2021</a:t>
+              <a:t>25.04.2023</a:t>
             </a:fld>
             <a:endParaRPr lang="de-DE"/>
           </a:p>
@@ -2429,7 +2448,7 @@
           <a:p>
             <a:fld id="{FCBDAD03-24C7-49E5-AC15-B8AB04B577B6}" type="slidenum">
               <a:rPr lang="de-DE" smtClean="0"/>
-              <a:t>‹Nr.›</a:t>
+              <a:t>‹#›</a:t>
             </a:fld>
             <a:endParaRPr lang="de-DE"/>
           </a:p>
@@ -2663,7 +2682,7 @@
           <a:p>
             <a:fld id="{6F3F68CC-1FAA-4176-AFE4-270A47A5A2D8}" type="datetimeFigureOut">
               <a:rPr lang="de-DE" smtClean="0"/>
-              <a:t>09.02.2021</a:t>
+              <a:t>25.04.2023</a:t>
             </a:fld>
             <a:endParaRPr lang="de-DE"/>
           </a:p>
@@ -2717,7 +2736,7 @@
           <a:p>
             <a:fld id="{FCBDAD03-24C7-49E5-AC15-B8AB04B577B6}" type="slidenum">
               <a:rPr lang="de-DE" smtClean="0"/>
-              <a:t>‹Nr.›</a:t>
+              <a:t>‹#›</a:t>
             </a:fld>
             <a:endParaRPr lang="de-DE"/>
           </a:p>
@@ -2904,7 +2923,7 @@
           <a:p>
             <a:fld id="{6F3F68CC-1FAA-4176-AFE4-270A47A5A2D8}" type="datetimeFigureOut">
               <a:rPr lang="de-DE" smtClean="0"/>
-              <a:t>09.02.2021</a:t>
+              <a:t>25.04.2023</a:t>
             </a:fld>
             <a:endParaRPr lang="de-DE"/>
           </a:p>
@@ -2994,7 +3013,7 @@
           <a:p>
             <a:fld id="{FCBDAD03-24C7-49E5-AC15-B8AB04B577B6}" type="slidenum">
               <a:rPr lang="de-DE" smtClean="0"/>
-              <a:t>‹Nr.›</a:t>
+              <a:t>‹#›</a:t>
             </a:fld>
             <a:endParaRPr lang="de-DE"/>
           </a:p>
@@ -3336,7 +3355,7 @@
           <p:nvPr/>
         </p:nvPicPr>
         <p:blipFill>
-          <a:blip r:embed="rId10" cstate="print">
+          <a:blip r:embed="rId9" cstate="print">
             <a:extLst>
               <a:ext uri="{28A0092B-C50C-407E-A947-70E740481C1C}">
                 <a14:useLocalDpi xmlns:a14="http://schemas.microsoft.com/office/drawing/2010/main" val="0"/>
@@ -3349,7 +3368,7 @@
         </p:blipFill>
         <p:spPr>
           <a:xfrm>
-            <a:off x="6465398" y="4758926"/>
+            <a:off x="5750983" y="4502535"/>
             <a:ext cx="1138365" cy="459608"/>
           </a:xfrm>
           <a:prstGeom prst="rect">
@@ -3372,7 +3391,7 @@
           <p:nvPr/>
         </p:nvPicPr>
         <p:blipFill>
-          <a:blip r:embed="rId11" cstate="print">
+          <a:blip r:embed="rId10" cstate="print">
             <a:extLst>
               <a:ext uri="{28A0092B-C50C-407E-A947-70E740481C1C}">
                 <a14:useLocalDpi xmlns:a14="http://schemas.microsoft.com/office/drawing/2010/main" val="0"/>
@@ -3385,7 +3404,7 @@
         </p:blipFill>
         <p:spPr>
           <a:xfrm>
-            <a:off x="5897947" y="4551950"/>
+            <a:off x="5183532" y="4295559"/>
             <a:ext cx="557332" cy="706886"/>
           </a:xfrm>
           <a:prstGeom prst="rect">
@@ -3408,7 +3427,7 @@
           <p:nvPr/>
         </p:nvPicPr>
         <p:blipFill>
-          <a:blip r:embed="rId12" cstate="print">
+          <a:blip r:embed="rId11" cstate="print">
             <a:extLst>
               <a:ext uri="{28A0092B-C50C-407E-A947-70E740481C1C}">
                 <a14:useLocalDpi xmlns:a14="http://schemas.microsoft.com/office/drawing/2010/main" val="0"/>
@@ -3421,7 +3440,7 @@
         </p:blipFill>
         <p:spPr>
           <a:xfrm>
-            <a:off x="7603763" y="4782737"/>
+            <a:off x="6889348" y="4526346"/>
             <a:ext cx="1199580" cy="459609"/>
           </a:xfrm>
           <a:prstGeom prst="rect">
@@ -3444,7 +3463,7 @@
           <p:nvPr/>
         </p:nvPicPr>
         <p:blipFill>
-          <a:blip r:embed="rId13">
+          <a:blip r:embed="rId12">
             <a:extLst>
               <a:ext uri="{28A0092B-C50C-407E-A947-70E740481C1C}">
                 <a14:useLocalDpi xmlns:a14="http://schemas.microsoft.com/office/drawing/2010/main" val="0"/>
@@ -3457,8 +3476,8 @@
         </p:blipFill>
         <p:spPr>
           <a:xfrm>
-            <a:off x="4657061" y="1168356"/>
-            <a:ext cx="2946702" cy="1152638"/>
+            <a:off x="3787982" y="903925"/>
+            <a:ext cx="3945266" cy="1543239"/>
           </a:xfrm>
           <a:prstGeom prst="rect">
             <a:avLst/>
@@ -3483,7 +3502,7 @@
         </p:nvSpPr>
         <p:spPr>
           <a:xfrm>
-            <a:off x="7068551" y="2790842"/>
+            <a:off x="7881348" y="2966333"/>
             <a:ext cx="550592" cy="561292"/>
           </a:xfrm>
           <a:prstGeom prst="rightArrow">
@@ -3585,7 +3604,7 @@
         </p:nvSpPr>
         <p:spPr>
           <a:xfrm>
-            <a:off x="4594807" y="2790842"/>
+            <a:off x="3089288" y="2966333"/>
             <a:ext cx="550592" cy="561292"/>
           </a:xfrm>
           <a:prstGeom prst="rightArrow">
@@ -3678,13 +3697,15 @@
               </a:ext>
             </a:extLst>
           </p:cNvPr>
-          <p:cNvGrpSpPr/>
+          <p:cNvGrpSpPr>
+            <a:grpSpLocks noChangeAspect="1"/>
+          </p:cNvGrpSpPr>
           <p:nvPr/>
         </p:nvGrpSpPr>
         <p:grpSpPr>
           <a:xfrm>
-            <a:off x="7907175" y="2231611"/>
-            <a:ext cx="3096344" cy="1728192"/>
+            <a:off x="8580041" y="2402812"/>
+            <a:ext cx="3288803" cy="1835611"/>
             <a:chOff x="7608168" y="3068960"/>
             <a:chExt cx="3096344" cy="1728192"/>
           </a:xfrm>
@@ -3703,12 +3724,12 @@
             </p:cNvPicPr>
             <p:nvPr>
               <p:custDataLst>
-                <p:tags r:id="rId6"/>
+                <p:tags r:id="rId5"/>
               </p:custDataLst>
             </p:nvPr>
           </p:nvPicPr>
           <p:blipFill rotWithShape="1">
-            <a:blip r:embed="rId14" cstate="print">
+            <a:blip r:embed="rId13" cstate="print">
               <a:extLst>
                 <a:ext uri="{28A0092B-C50C-407E-A947-70E740481C1C}">
                   <a14:useLocalDpi xmlns:a14="http://schemas.microsoft.com/office/drawing/2010/main" val="0"/>
@@ -3777,12 +3798,12 @@
               </p:cNvPicPr>
               <p:nvPr>
                 <p:custDataLst>
-                  <p:tags r:id="rId7"/>
+                  <p:tags r:id="rId6"/>
                 </p:custDataLst>
               </p:nvPr>
             </p:nvPicPr>
             <p:blipFill rotWithShape="1">
-              <a:blip r:embed="rId15" cstate="print">
+              <a:blip r:embed="rId14" cstate="print">
                 <a:extLst>
                   <a:ext uri="{28A0092B-C50C-407E-A947-70E740481C1C}">
                     <a14:useLocalDpi xmlns:a14="http://schemas.microsoft.com/office/drawing/2010/main" val="0"/>
@@ -3824,12 +3845,12 @@
               </p:cNvPicPr>
               <p:nvPr>
                 <p:custDataLst>
-                  <p:tags r:id="rId8"/>
+                  <p:tags r:id="rId7"/>
                 </p:custDataLst>
               </p:nvPr>
             </p:nvPicPr>
             <p:blipFill>
-              <a:blip r:embed="rId16" cstate="print"/>
+              <a:blip r:embed="rId15" cstate="print"/>
               <a:srcRect/>
               <a:stretch>
                 <a:fillRect/>
@@ -3934,7 +3955,7 @@
         </p:nvGrpSpPr>
         <p:grpSpPr>
           <a:xfrm>
-            <a:off x="1904802" y="1962524"/>
+            <a:off x="426988" y="2138015"/>
             <a:ext cx="2485515" cy="2364520"/>
             <a:chOff x="2263817" y="2809904"/>
             <a:chExt cx="2485515" cy="2364520"/>
@@ -3954,12 +3975,12 @@
             </p:cNvPicPr>
             <p:nvPr>
               <p:custDataLst>
-                <p:tags r:id="rId4"/>
+                <p:tags r:id="rId3"/>
               </p:custDataLst>
             </p:nvPr>
           </p:nvPicPr>
           <p:blipFill>
-            <a:blip r:embed="rId17" cstate="print"/>
+            <a:blip r:embed="rId16" cstate="print"/>
             <a:srcRect l="9358" t="53114" r="22726" b="35350"/>
             <a:stretch>
               <a:fillRect/>
@@ -3996,12 +4017,12 @@
             </p:cNvPicPr>
             <p:nvPr>
               <p:custDataLst>
-                <p:tags r:id="rId5"/>
+                <p:tags r:id="rId4"/>
               </p:custDataLst>
             </p:nvPr>
           </p:nvPicPr>
           <p:blipFill>
-            <a:blip r:embed="rId18" cstate="print"/>
+            <a:blip r:embed="rId17" cstate="print"/>
             <a:srcRect/>
             <a:stretch>
               <a:fillRect/>
@@ -4039,7 +4060,7 @@
             <p:nvPr/>
           </p:nvPicPr>
           <p:blipFill>
-            <a:blip r:embed="rId19" cstate="print">
+            <a:blip r:embed="rId18" cstate="print">
               <a:extLst>
                 <a:ext uri="{28A0092B-C50C-407E-A947-70E740481C1C}">
                   <a14:useLocalDpi xmlns:a14="http://schemas.microsoft.com/office/drawing/2010/main" val="0"/>
@@ -4061,90 +4082,42 @@
           </p:spPr>
         </p:pic>
       </p:grpSp>
-      <p:sp>
-        <p:nvSpPr>
-          <p:cNvPr id="61" name="Abgerundetes Rechteck 21">
-            <a:extLst>
-              <a:ext uri="{FF2B5EF4-FFF2-40B4-BE49-F238E27FC236}">
-                <a16:creationId xmlns:a16="http://schemas.microsoft.com/office/drawing/2014/main" id="{9D6CFFC5-5C92-4209-8645-BAB421658102}"/>
-              </a:ext>
-            </a:extLst>
-          </p:cNvPr>
-          <p:cNvSpPr/>
-          <p:nvPr>
-            <p:custDataLst>
-              <p:tags r:id="rId3"/>
-            </p:custDataLst>
-          </p:nvPr>
-        </p:nvSpPr>
+      <p:pic>
+        <p:nvPicPr>
+          <p:cNvPr id="63" name="Grafik 62">
+            <a:extLst>
+              <a:ext uri="{FF2B5EF4-FFF2-40B4-BE49-F238E27FC236}">
+                <a16:creationId xmlns:a16="http://schemas.microsoft.com/office/drawing/2014/main" id="{01661F66-89BA-4B8F-907D-EC032CE7FB91}"/>
+              </a:ext>
+            </a:extLst>
+          </p:cNvPr>
+          <p:cNvPicPr>
+            <a:picLocks noChangeAspect="1"/>
+          </p:cNvPicPr>
+          <p:nvPr/>
+        </p:nvPicPr>
+        <p:blipFill>
+          <a:blip r:embed="rId19"/>
+          <a:stretch>
+            <a:fillRect/>
+          </a:stretch>
+        </p:blipFill>
         <p:spPr>
           <a:xfrm>
-            <a:off x="5507514" y="2663659"/>
-            <a:ext cx="1245796" cy="876287"/>
+            <a:off x="4309145" y="4280616"/>
+            <a:ext cx="953369" cy="718205"/>
           </a:xfrm>
-          <a:prstGeom prst="roundRect">
+          <a:prstGeom prst="rect">
             <a:avLst/>
           </a:prstGeom>
-          <a:solidFill>
-            <a:srgbClr val="2484C6"/>
-          </a:solidFill>
-          <a:ln w="25400" cap="flat" cmpd="sng" algn="ctr">
-            <a:solidFill>
-              <a:srgbClr val="2484C6">
-                <a:shade val="50000"/>
-              </a:srgbClr>
-            </a:solidFill>
-            <a:prstDash val="solid"/>
-          </a:ln>
-          <a:effectLst/>
         </p:spPr>
-        <p:txBody>
-          <a:bodyPr lIns="0" tIns="144000" rIns="0" anchor="ctr"/>
-          <a:lstStyle/>
-          <a:p>
-            <a:pPr marL="0" marR="0" lvl="0" indent="0" defTabSz="914400" eaLnBrk="1" fontAlgn="auto" latinLnBrk="0" hangingPunct="1">
-              <a:lnSpc>
-                <a:spcPct val="100000"/>
-              </a:lnSpc>
-              <a:spcBef>
-                <a:spcPts val="0"/>
-              </a:spcBef>
-              <a:spcAft>
-                <a:spcPts val="0"/>
-              </a:spcAft>
-              <a:buClrTx/>
-              <a:buSzTx/>
-              <a:buFontTx/>
-              <a:buNone/>
-              <a:tabLst/>
-              <a:defRPr/>
-            </a:pPr>
-            <a:r>
-              <a:rPr kumimoji="0" lang="en-US" sz="2800" b="1" i="0" u="none" strike="noStrike" kern="0" cap="none" spc="0" normalizeH="0" baseline="0" noProof="0" dirty="0">
-                <a:ln>
-                  <a:noFill/>
-                </a:ln>
-                <a:solidFill>
-                  <a:prstClr val="white"/>
-                </a:solidFill>
-                <a:effectLst/>
-                <a:uLnTx/>
-                <a:uFillTx/>
-                <a:latin typeface="Calibri"/>
-                <a:ea typeface="+mn-ea"/>
-                <a:cs typeface="+mn-cs"/>
-              </a:rPr>
-              <a:t> </a:t>
-            </a:r>
-          </a:p>
-        </p:txBody>
-      </p:sp>
+      </p:pic>
       <p:pic>
         <p:nvPicPr>
-          <p:cNvPr id="62" name="Grafik 61">
-            <a:extLst>
-              <a:ext uri="{FF2B5EF4-FFF2-40B4-BE49-F238E27FC236}">
-                <a16:creationId xmlns:a16="http://schemas.microsoft.com/office/drawing/2014/main" id="{AF175E3A-AF99-4F8F-8B34-A22824A75FEE}"/>
+          <p:cNvPr id="64" name="Grafik 63">
+            <a:extLst>
+              <a:ext uri="{FF2B5EF4-FFF2-40B4-BE49-F238E27FC236}">
+                <a16:creationId xmlns:a16="http://schemas.microsoft.com/office/drawing/2014/main" id="{F817C01E-FD24-4098-B0B8-3050A71FD1FC}"/>
               </a:ext>
             </a:extLst>
           </p:cNvPr>
@@ -4161,8 +4134,8 @@
         </p:blipFill>
         <p:spPr>
           <a:xfrm>
-            <a:off x="5671258" y="2855242"/>
-            <a:ext cx="880077" cy="542241"/>
+            <a:off x="3525077" y="4406145"/>
+            <a:ext cx="647619" cy="485714"/>
           </a:xfrm>
           <a:prstGeom prst="rect">
             <a:avLst/>
@@ -4171,58 +4144,28 @@
       </p:pic>
       <p:pic>
         <p:nvPicPr>
-          <p:cNvPr id="63" name="Grafik 62">
-            <a:extLst>
-              <a:ext uri="{FF2B5EF4-FFF2-40B4-BE49-F238E27FC236}">
-                <a16:creationId xmlns:a16="http://schemas.microsoft.com/office/drawing/2014/main" id="{01661F66-89BA-4B8F-907D-EC032CE7FB91}"/>
-              </a:ext>
-            </a:extLst>
-          </p:cNvPr>
+          <p:cNvPr id="3" name="Picture 2"/>
           <p:cNvPicPr>
             <a:picLocks noChangeAspect="1"/>
           </p:cNvPicPr>
           <p:nvPr/>
         </p:nvPicPr>
         <p:blipFill>
-          <a:blip r:embed="rId21"/>
+          <a:blip r:embed="rId21">
+            <a:extLst>
+              <a:ext uri="{28A0092B-C50C-407E-A947-70E740481C1C}">
+                <a14:useLocalDpi xmlns:a14="http://schemas.microsoft.com/office/drawing/2010/main" val="0"/>
+              </a:ext>
+            </a:extLst>
+          </a:blip>
           <a:stretch>
             <a:fillRect/>
           </a:stretch>
         </p:blipFill>
         <p:spPr>
           <a:xfrm>
-            <a:off x="5023560" y="4537007"/>
-            <a:ext cx="953369" cy="718205"/>
-          </a:xfrm>
-          <a:prstGeom prst="rect">
-            <a:avLst/>
-          </a:prstGeom>
-        </p:spPr>
-      </p:pic>
-      <p:pic>
-        <p:nvPicPr>
-          <p:cNvPr id="64" name="Grafik 63">
-            <a:extLst>
-              <a:ext uri="{FF2B5EF4-FFF2-40B4-BE49-F238E27FC236}">
-                <a16:creationId xmlns:a16="http://schemas.microsoft.com/office/drawing/2014/main" id="{F817C01E-FD24-4098-B0B8-3050A71FD1FC}"/>
-              </a:ext>
-            </a:extLst>
-          </p:cNvPr>
-          <p:cNvPicPr>
-            <a:picLocks noChangeAspect="1"/>
-          </p:cNvPicPr>
-          <p:nvPr/>
-        </p:nvPicPr>
-        <p:blipFill>
-          <a:blip r:embed="rId22"/>
-          <a:stretch>
-            <a:fillRect/>
-          </a:stretch>
-        </p:blipFill>
-        <p:spPr>
-          <a:xfrm>
-            <a:off x="4239492" y="4662536"/>
-            <a:ext cx="647619" cy="485714"/>
+            <a:off x="3787981" y="2798767"/>
+            <a:ext cx="3945266" cy="944862"/>
           </a:xfrm>
           <a:prstGeom prst="rect">
             <a:avLst/>
@@ -4259,7 +4202,7 @@
 <file path=ppt/tags/tag3.xml><?xml version="1.0" encoding="utf-8"?>
 <p:tagLst xmlns:a="http://schemas.openxmlformats.org/drawingml/2006/main" xmlns:r="http://schemas.openxmlformats.org/officeDocument/2006/relationships" xmlns:p="http://schemas.openxmlformats.org/presentationml/2006/main">
   <p:tag name="COLORSETCLASSNAME" val="ColorSet1"/>
-  <p:tag name="COLORS" val="-1;-1;-2;-2;White;Black"/>
+  <p:tag name="COLORS" val="-2;-2;-2;-2;-1;-2"/>
 </p:tagLst>
 </file>
 
@@ -4272,7 +4215,7 @@
 
 <file path=ppt/tags/tag5.xml><?xml version="1.0" encoding="utf-8"?>
 <p:tagLst xmlns:a="http://schemas.openxmlformats.org/drawingml/2006/main" xmlns:r="http://schemas.openxmlformats.org/officeDocument/2006/relationships" xmlns:p="http://schemas.openxmlformats.org/presentationml/2006/main">
-  <p:tag name="COLORSETCLASSNAME" val="ColorSet1"/>
+  <p:tag name="COLORSETCLASSNAME" val="ColorSet2"/>
   <p:tag name="COLORS" val="-2;-2;-2;-2;-1;-2"/>
 </p:tagLst>
 </file>
@@ -4285,13 +4228,6 @@
 </file>
 
 <file path=ppt/tags/tag7.xml><?xml version="1.0" encoding="utf-8"?>
-<p:tagLst xmlns:a="http://schemas.openxmlformats.org/drawingml/2006/main" xmlns:r="http://schemas.openxmlformats.org/officeDocument/2006/relationships" xmlns:p="http://schemas.openxmlformats.org/presentationml/2006/main">
-  <p:tag name="COLORSETCLASSNAME" val="ColorSet2"/>
-  <p:tag name="COLORS" val="-2;-2;-2;-2;-1;-2"/>
-</p:tagLst>
-</file>
-
-<file path=ppt/tags/tag8.xml><?xml version="1.0" encoding="utf-8"?>
 <p:tagLst xmlns:a="http://schemas.openxmlformats.org/drawingml/2006/main" xmlns:r="http://schemas.openxmlformats.org/officeDocument/2006/relationships" xmlns:p="http://schemas.openxmlformats.org/presentationml/2006/main">
   <p:tag name="COLORS" val="-2;-2;-2;-2;-1;-2"/>
   <p:tag name="COLORSETCLASSNAME" val="ColorSet2"/>

</xml_diff>